<commit_message>
Update Paper Final Version
</commit_message>
<xml_diff>
--- a/Publish Paper/Diagram/Model Structure.pptx
+++ b/Publish Paper/Diagram/Model Structure.pptx
@@ -244,7 +244,7 @@
           <a:p>
             <a:fld id="{13AD9B76-61A4-431E-9D6B-03B2CF81DE04}" type="datetimeFigureOut">
               <a:rPr lang="en-US" smtClean="0"/>
-              <a:t>7/8/2022</a:t>
+              <a:t>9/30/2022</a:t>
             </a:fld>
             <a:endParaRPr lang="en-US"/>
           </a:p>
@@ -414,7 +414,7 @@
           <a:p>
             <a:fld id="{13AD9B76-61A4-431E-9D6B-03B2CF81DE04}" type="datetimeFigureOut">
               <a:rPr lang="en-US" smtClean="0"/>
-              <a:t>7/8/2022</a:t>
+              <a:t>9/30/2022</a:t>
             </a:fld>
             <a:endParaRPr lang="en-US"/>
           </a:p>
@@ -594,7 +594,7 @@
           <a:p>
             <a:fld id="{13AD9B76-61A4-431E-9D6B-03B2CF81DE04}" type="datetimeFigureOut">
               <a:rPr lang="en-US" smtClean="0"/>
-              <a:t>7/8/2022</a:t>
+              <a:t>9/30/2022</a:t>
             </a:fld>
             <a:endParaRPr lang="en-US"/>
           </a:p>
@@ -764,7 +764,7 @@
           <a:p>
             <a:fld id="{13AD9B76-61A4-431E-9D6B-03B2CF81DE04}" type="datetimeFigureOut">
               <a:rPr lang="en-US" smtClean="0"/>
-              <a:t>7/8/2022</a:t>
+              <a:t>9/30/2022</a:t>
             </a:fld>
             <a:endParaRPr lang="en-US"/>
           </a:p>
@@ -1010,7 +1010,7 @@
           <a:p>
             <a:fld id="{13AD9B76-61A4-431E-9D6B-03B2CF81DE04}" type="datetimeFigureOut">
               <a:rPr lang="en-US" smtClean="0"/>
-              <a:t>7/8/2022</a:t>
+              <a:t>9/30/2022</a:t>
             </a:fld>
             <a:endParaRPr lang="en-US"/>
           </a:p>
@@ -1242,7 +1242,7 @@
           <a:p>
             <a:fld id="{13AD9B76-61A4-431E-9D6B-03B2CF81DE04}" type="datetimeFigureOut">
               <a:rPr lang="en-US" smtClean="0"/>
-              <a:t>7/8/2022</a:t>
+              <a:t>9/30/2022</a:t>
             </a:fld>
             <a:endParaRPr lang="en-US"/>
           </a:p>
@@ -1609,7 +1609,7 @@
           <a:p>
             <a:fld id="{13AD9B76-61A4-431E-9D6B-03B2CF81DE04}" type="datetimeFigureOut">
               <a:rPr lang="en-US" smtClean="0"/>
-              <a:t>7/8/2022</a:t>
+              <a:t>9/30/2022</a:t>
             </a:fld>
             <a:endParaRPr lang="en-US"/>
           </a:p>
@@ -1727,7 +1727,7 @@
           <a:p>
             <a:fld id="{13AD9B76-61A4-431E-9D6B-03B2CF81DE04}" type="datetimeFigureOut">
               <a:rPr lang="en-US" smtClean="0"/>
-              <a:t>7/8/2022</a:t>
+              <a:t>9/30/2022</a:t>
             </a:fld>
             <a:endParaRPr lang="en-US"/>
           </a:p>
@@ -1822,7 +1822,7 @@
           <a:p>
             <a:fld id="{13AD9B76-61A4-431E-9D6B-03B2CF81DE04}" type="datetimeFigureOut">
               <a:rPr lang="en-US" smtClean="0"/>
-              <a:t>7/8/2022</a:t>
+              <a:t>9/30/2022</a:t>
             </a:fld>
             <a:endParaRPr lang="en-US"/>
           </a:p>
@@ -2099,7 +2099,7 @@
           <a:p>
             <a:fld id="{13AD9B76-61A4-431E-9D6B-03B2CF81DE04}" type="datetimeFigureOut">
               <a:rPr lang="en-US" smtClean="0"/>
-              <a:t>7/8/2022</a:t>
+              <a:t>9/30/2022</a:t>
             </a:fld>
             <a:endParaRPr lang="en-US"/>
           </a:p>
@@ -2356,7 +2356,7 @@
           <a:p>
             <a:fld id="{13AD9B76-61A4-431E-9D6B-03B2CF81DE04}" type="datetimeFigureOut">
               <a:rPr lang="en-US" smtClean="0"/>
-              <a:t>7/8/2022</a:t>
+              <a:t>9/30/2022</a:t>
             </a:fld>
             <a:endParaRPr lang="en-US"/>
           </a:p>
@@ -2569,7 +2569,7 @@
           <a:p>
             <a:fld id="{13AD9B76-61A4-431E-9D6B-03B2CF81DE04}" type="datetimeFigureOut">
               <a:rPr lang="en-US" smtClean="0"/>
-              <a:t>7/8/2022</a:t>
+              <a:t>9/30/2022</a:t>
             </a:fld>
             <a:endParaRPr lang="en-US"/>
           </a:p>
@@ -3150,7 +3150,7 @@
                 <a:pPr algn="ctr"/>
                 <a:r>
                   <a:rPr lang="en-US" sz="2000" b="1" dirty="0"/>
-                  <a:t>Dense Block_1 x 6</a:t>
+                  <a:t>Dense Block_1 × 6</a:t>
                 </a:r>
               </a:p>
             </p:txBody>
@@ -3244,7 +3244,7 @@
                 <a:pPr algn="ctr"/>
                 <a:r>
                   <a:rPr lang="en-US" sz="2000" b="1" dirty="0"/>
-                  <a:t>Dense Block_2 x 12</a:t>
+                  <a:t>Dense Block_2 × 12</a:t>
                 </a:r>
               </a:p>
             </p:txBody>
@@ -3338,7 +3338,7 @@
                 <a:pPr algn="ctr"/>
                 <a:r>
                   <a:rPr lang="en-US" sz="2000" b="1" dirty="0"/>
-                  <a:t>Dense Block_3 x 48</a:t>
+                  <a:t>Dense Block_3 × 48</a:t>
                 </a:r>
               </a:p>
             </p:txBody>
@@ -3432,7 +3432,7 @@
                 <a:pPr algn="ctr"/>
                 <a:r>
                   <a:rPr lang="en-US" sz="2000" b="1" dirty="0"/>
-                  <a:t>Dense Block_4 x 29</a:t>
+                  <a:t>Dense Block_4 × 29</a:t>
                 </a:r>
               </a:p>
             </p:txBody>
@@ -4110,7 +4110,7 @@
                 <a:pPr algn="ctr"/>
                 <a:r>
                   <a:rPr lang="en-US" sz="2000" b="1" dirty="0"/>
-                  <a:t>Inception Resnet A x 10</a:t>
+                  <a:t>Inception Resnet A × 10</a:t>
                 </a:r>
               </a:p>
             </p:txBody>
@@ -4204,7 +4204,7 @@
                 <a:pPr algn="ctr"/>
                 <a:r>
                   <a:rPr lang="en-US" sz="2000" b="1" dirty="0"/>
-                  <a:t>Inception Resnet B x 20</a:t>
+                  <a:t>Inception Resnet B × 20</a:t>
                 </a:r>
               </a:p>
             </p:txBody>
@@ -4298,7 +4298,7 @@
                 <a:pPr algn="ctr"/>
                 <a:r>
                   <a:rPr lang="en-US" sz="2000" b="1" dirty="0"/>
-                  <a:t>Inception Resnet C x 8</a:t>
+                  <a:t>Inception Resnet C × 8</a:t>
                 </a:r>
               </a:p>
             </p:txBody>
@@ -4892,7 +4892,7 @@
                 <a:pPr algn="ctr"/>
                 <a:r>
                   <a:rPr lang="en-US" sz="2000" b="1" dirty="0"/>
-                  <a:t>Residual Block x 3</a:t>
+                  <a:t>Residual Block × 3</a:t>
                 </a:r>
               </a:p>
             </p:txBody>
@@ -4939,7 +4939,7 @@
                 <a:pPr algn="ctr"/>
                 <a:r>
                   <a:rPr lang="en-US" sz="2000" b="1" dirty="0"/>
-                  <a:t>Residual Block x 4</a:t>
+                  <a:t>Residual Block × 4</a:t>
                 </a:r>
               </a:p>
             </p:txBody>
@@ -4986,7 +4986,7 @@
                 <a:pPr algn="ctr"/>
                 <a:r>
                   <a:rPr lang="en-US" sz="2000" b="1" dirty="0"/>
-                  <a:t>Residual Block x 6</a:t>
+                  <a:t>Residual Block × 6</a:t>
                 </a:r>
               </a:p>
             </p:txBody>
@@ -5497,7 +5497,7 @@
                 <a:pPr algn="ctr"/>
                 <a:r>
                   <a:rPr lang="en-US" sz="2000" b="1" dirty="0"/>
-                  <a:t>Residual Block x 3</a:t>
+                  <a:t>Residual Block × 3</a:t>
                 </a:r>
               </a:p>
             </p:txBody>
@@ -5544,7 +5544,7 @@
                 <a:pPr algn="ctr"/>
                 <a:r>
                   <a:rPr lang="en-US" sz="2000" b="1" dirty="0"/>
-                  <a:t>Residual Block x 8</a:t>
+                  <a:t>Residual Block × 8</a:t>
                 </a:r>
               </a:p>
             </p:txBody>
@@ -5591,7 +5591,7 @@
                 <a:pPr algn="ctr"/>
                 <a:r>
                   <a:rPr lang="en-US" sz="2000" b="1" dirty="0"/>
-                  <a:t>Residual Block x 36</a:t>
+                  <a:t>Residual Block × 36</a:t>
                 </a:r>
               </a:p>
             </p:txBody>
@@ -7201,7 +7201,7 @@
                 <a:pPr algn="ctr"/>
                 <a:r>
                   <a:rPr lang="en-US" sz="2000" b="1" dirty="0"/>
-                  <a:t>Bottleneck x 2</a:t>
+                  <a:t>Bottleneck × 2</a:t>
                 </a:r>
               </a:p>
             </p:txBody>
@@ -7248,7 +7248,7 @@
                 <a:pPr algn="ctr"/>
                 <a:r>
                   <a:rPr lang="en-US" sz="2000" b="1" dirty="0"/>
-                  <a:t>Bottleneck x 3</a:t>
+                  <a:t>Bottleneck × 3</a:t>
                 </a:r>
               </a:p>
             </p:txBody>
@@ -7295,7 +7295,7 @@
                 <a:pPr algn="ctr"/>
                 <a:r>
                   <a:rPr lang="en-US" sz="2000" b="1" dirty="0"/>
-                  <a:t>Bottleneck x 4</a:t>
+                  <a:t>Bottleneck × 4</a:t>
                 </a:r>
               </a:p>
             </p:txBody>
@@ -7342,7 +7342,7 @@
                 <a:pPr algn="ctr"/>
                 <a:r>
                   <a:rPr lang="en-US" sz="2000" b="1" dirty="0"/>
-                  <a:t>Bottleneck x 3</a:t>
+                  <a:t>Bottleneck × 3</a:t>
                 </a:r>
               </a:p>
             </p:txBody>
@@ -7936,7 +7936,7 @@
                 <a:pPr algn="ctr"/>
                 <a:r>
                   <a:rPr lang="en-US" sz="2000" b="1" dirty="0"/>
-                  <a:t>Bottleneck 3x3 SE</a:t>
+                  <a:t>Bottleneck 3 × 3 SE</a:t>
                 </a:r>
               </a:p>
             </p:txBody>
@@ -7983,7 +7983,7 @@
                 <a:pPr algn="ctr"/>
                 <a:r>
                   <a:rPr lang="en-US" sz="2000" b="1" dirty="0"/>
-                  <a:t>Bottleneck 3x3</a:t>
+                  <a:t>Bottleneck 3 × 3</a:t>
                 </a:r>
               </a:p>
             </p:txBody>
@@ -8030,7 +8030,7 @@
                 <a:pPr algn="ctr"/>
                 <a:r>
                   <a:rPr lang="en-US" sz="2000" b="1" dirty="0"/>
-                  <a:t>Bottleneck 5x5 SE 8 repeated</a:t>
+                  <a:t>Bottleneck 5 × 5 SE 8 repeated</a:t>
                 </a:r>
               </a:p>
             </p:txBody>
@@ -8453,7 +8453,7 @@
                 <a:pPr algn="ctr"/>
                 <a:r>
                   <a:rPr lang="en-US" sz="2000" b="1" dirty="0"/>
-                  <a:t>Bottleneck 3x3 3 repeated</a:t>
+                  <a:t>Bottleneck 3 × 3 3 repeated</a:t>
                 </a:r>
               </a:p>
             </p:txBody>
@@ -8500,7 +8500,7 @@
                 <a:pPr algn="ctr"/>
                 <a:r>
                   <a:rPr lang="en-US" sz="2000" b="1" dirty="0"/>
-                  <a:t>Bottleneck 5x5 SE 3 repeated</a:t>
+                  <a:t>Bottleneck 5 × 5 SE 3 repeated</a:t>
                 </a:r>
               </a:p>
             </p:txBody>
@@ -8547,7 +8547,7 @@
                 <a:pPr algn="ctr"/>
                 <a:r>
                   <a:rPr lang="en-US" sz="2000" b="1" dirty="0"/>
-                  <a:t>Bottleneck 3 x 3 4 repeated</a:t>
+                  <a:t>Bottleneck 3 × 3 4 repeated</a:t>
                 </a:r>
               </a:p>
             </p:txBody>
@@ -8594,7 +8594,7 @@
                 <a:pPr algn="ctr"/>
                 <a:r>
                   <a:rPr lang="en-US" sz="2000" b="1" dirty="0"/>
-                  <a:t>Bottleneck 3x3 SE 2 repeated</a:t>
+                  <a:t>Bottleneck 3 × 3 SE 2 repeated</a:t>
                 </a:r>
               </a:p>
             </p:txBody>
@@ -8641,7 +8641,7 @@
                 <a:pPr algn="ctr"/>
                 <a:r>
                   <a:rPr lang="en-US" sz="2000" b="1" dirty="0"/>
-                  <a:t>Bottleneck 5x5 SE 3 repeated</a:t>
+                  <a:t>Bottleneck 5 × 5 SE 3 repeated</a:t>
                 </a:r>
               </a:p>
             </p:txBody>

</xml_diff>